<commit_message>
updated poster for Math Fest
added a new figure and fixed the layout to adjust white space. last iteration was looking a little empty
</commit_message>
<xml_diff>
--- a/Poster and Abstracts/NYCCT Spring Poster.pptx
+++ b/Poster and Abstracts/NYCCT Spring Poster.pptx
@@ -217,7 +217,7 @@
           <a:p>
             <a:fld id="{D39C35D6-E231-6046-8009-35678AC71C58}" type="datetimeFigureOut">
               <a:rPr lang="en-US" smtClean="0"/>
-              <a:t>5/2/2024</a:t>
+              <a:t>8/4/2024</a:t>
             </a:fld>
             <a:endParaRPr lang="en-US"/>
           </a:p>
@@ -753,7 +753,7 @@
             <a:fld id="{1D8BD707-D9CF-40AE-B4C6-C98DA3205C09}" type="datetimeFigureOut">
               <a:rPr lang="en-US" smtClean="0"/>
               <a:pPr/>
-              <a:t>5/2/2024</a:t>
+              <a:t>8/4/2024</a:t>
             </a:fld>
             <a:endParaRPr lang="en-US"/>
           </a:p>
@@ -918,7 +918,7 @@
             <a:fld id="{1D8BD707-D9CF-40AE-B4C6-C98DA3205C09}" type="datetimeFigureOut">
               <a:rPr lang="en-US" smtClean="0"/>
               <a:pPr/>
-              <a:t>5/2/2024</a:t>
+              <a:t>8/4/2024</a:t>
             </a:fld>
             <a:endParaRPr lang="en-US"/>
           </a:p>
@@ -1093,7 +1093,7 @@
             <a:fld id="{1D8BD707-D9CF-40AE-B4C6-C98DA3205C09}" type="datetimeFigureOut">
               <a:rPr lang="en-US" smtClean="0"/>
               <a:pPr/>
-              <a:t>5/2/2024</a:t>
+              <a:t>8/4/2024</a:t>
             </a:fld>
             <a:endParaRPr lang="en-US"/>
           </a:p>
@@ -1258,7 +1258,7 @@
             <a:fld id="{1D8BD707-D9CF-40AE-B4C6-C98DA3205C09}" type="datetimeFigureOut">
               <a:rPr lang="en-US" smtClean="0"/>
               <a:pPr/>
-              <a:t>5/2/2024</a:t>
+              <a:t>8/4/2024</a:t>
             </a:fld>
             <a:endParaRPr lang="en-US"/>
           </a:p>
@@ -1500,7 +1500,7 @@
             <a:fld id="{1D8BD707-D9CF-40AE-B4C6-C98DA3205C09}" type="datetimeFigureOut">
               <a:rPr lang="en-US" smtClean="0"/>
               <a:pPr/>
-              <a:t>5/2/2024</a:t>
+              <a:t>8/4/2024</a:t>
             </a:fld>
             <a:endParaRPr lang="en-US"/>
           </a:p>
@@ -1782,7 +1782,7 @@
             <a:fld id="{1D8BD707-D9CF-40AE-B4C6-C98DA3205C09}" type="datetimeFigureOut">
               <a:rPr lang="en-US" smtClean="0"/>
               <a:pPr/>
-              <a:t>5/2/2024</a:t>
+              <a:t>8/4/2024</a:t>
             </a:fld>
             <a:endParaRPr lang="en-US"/>
           </a:p>
@@ -2198,7 +2198,7 @@
             <a:fld id="{1D8BD707-D9CF-40AE-B4C6-C98DA3205C09}" type="datetimeFigureOut">
               <a:rPr lang="en-US" smtClean="0"/>
               <a:pPr/>
-              <a:t>5/2/2024</a:t>
+              <a:t>8/4/2024</a:t>
             </a:fld>
             <a:endParaRPr lang="en-US"/>
           </a:p>
@@ -2312,7 +2312,7 @@
             <a:fld id="{1D8BD707-D9CF-40AE-B4C6-C98DA3205C09}" type="datetimeFigureOut">
               <a:rPr lang="en-US" smtClean="0"/>
               <a:pPr/>
-              <a:t>5/2/2024</a:t>
+              <a:t>8/4/2024</a:t>
             </a:fld>
             <a:endParaRPr lang="en-US"/>
           </a:p>
@@ -2404,7 +2404,7 @@
             <a:fld id="{1D8BD707-D9CF-40AE-B4C6-C98DA3205C09}" type="datetimeFigureOut">
               <a:rPr lang="en-US" smtClean="0"/>
               <a:pPr/>
-              <a:t>5/2/2024</a:t>
+              <a:t>8/4/2024</a:t>
             </a:fld>
             <a:endParaRPr lang="en-US"/>
           </a:p>
@@ -2676,7 +2676,7 @@
             <a:fld id="{1D8BD707-D9CF-40AE-B4C6-C98DA3205C09}" type="datetimeFigureOut">
               <a:rPr lang="en-US" smtClean="0"/>
               <a:pPr/>
-              <a:t>5/2/2024</a:t>
+              <a:t>8/4/2024</a:t>
             </a:fld>
             <a:endParaRPr lang="en-US"/>
           </a:p>
@@ -2925,7 +2925,7 @@
             <a:fld id="{1D8BD707-D9CF-40AE-B4C6-C98DA3205C09}" type="datetimeFigureOut">
               <a:rPr lang="en-US" smtClean="0"/>
               <a:pPr/>
-              <a:t>5/2/2024</a:t>
+              <a:t>8/4/2024</a:t>
             </a:fld>
             <a:endParaRPr lang="en-US"/>
           </a:p>
@@ -3133,7 +3133,7 @@
             <a:fld id="{1D8BD707-D9CF-40AE-B4C6-C98DA3205C09}" type="datetimeFigureOut">
               <a:rPr lang="en-US" smtClean="0"/>
               <a:pPr/>
-              <a:t>5/2/2024</a:t>
+              <a:t>8/4/2024</a:t>
             </a:fld>
             <a:endParaRPr lang="en-US"/>
           </a:p>
@@ -3575,7 +3575,7 @@
         <p:spPr>
           <a:xfrm>
             <a:off x="981075" y="6440493"/>
-            <a:ext cx="10601325" cy="7885107"/>
+            <a:ext cx="11437753" cy="6285952"/>
           </a:xfrm>
           <a:prstGeom prst="rect">
             <a:avLst/>
@@ -3689,8 +3689,6 @@
               </a:rPr>
               <a:t>Abstract</a:t>
             </a:r>
-          </a:p>
-          <a:p>
             <a:endParaRPr lang="en-US" sz="2800" b="1" dirty="0">
               <a:latin typeface="Aptos" panose="020B0004020202020204" pitchFamily="34" charset="0"/>
               <a:cs typeface="Times New Roman" panose="02020603050405020304" pitchFamily="18" charset="0"/>
@@ -4159,8 +4157,8 @@
         </p:nvSpPr>
         <p:spPr>
           <a:xfrm>
-            <a:off x="981074" y="14210425"/>
-            <a:ext cx="10601325" cy="3544175"/>
+            <a:off x="981075" y="12998608"/>
+            <a:ext cx="11437753" cy="3113288"/>
           </a:xfrm>
           <a:prstGeom prst="rect">
             <a:avLst/>
@@ -4183,8 +4181,6 @@
               </a:rPr>
               <a:t>Background</a:t>
             </a:r>
-          </a:p>
-          <a:p>
             <a:endParaRPr lang="en-US" sz="2800" b="1" dirty="0">
               <a:solidFill>
                 <a:srgbClr val="000000"/>
@@ -4224,8 +4220,8 @@
         </p:nvSpPr>
         <p:spPr>
           <a:xfrm>
-            <a:off x="12300017" y="6402277"/>
-            <a:ext cx="11011339" cy="5093702"/>
+            <a:off x="12917860" y="13468648"/>
+            <a:ext cx="11011339" cy="5524589"/>
           </a:xfrm>
           <a:prstGeom prst="rect">
             <a:avLst/>
@@ -4271,12 +4267,31 @@
             </a:r>
             <a:r>
               <a:rPr lang="en-US" sz="2800" dirty="0" err="1">
-                <a:effectLst/>
-                <a:latin typeface="Aptos" panose="020B0004020202020204" pitchFamily="34" charset="0"/>
-                <a:ea typeface="Aptos" panose="020B0004020202020204" pitchFamily="34" charset="0"/>
+                <a:latin typeface="Times New Roman" panose="02020603050405020304" pitchFamily="18" charset="0"/>
                 <a:cs typeface="Times New Roman" panose="02020603050405020304" pitchFamily="18" charset="0"/>
               </a:rPr>
               <a:t>Hamian</a:t>
+            </a:r>
+            <a:r>
+              <a:rPr lang="en-US" sz="2800" dirty="0">
+                <a:latin typeface="Times New Roman" panose="02020603050405020304" pitchFamily="18" charset="0"/>
+                <a:cs typeface="Times New Roman" panose="02020603050405020304" pitchFamily="18" charset="0"/>
+              </a:rPr>
+              <a:t>, S., Yamada, T., </a:t>
+            </a:r>
+            <a:r>
+              <a:rPr lang="en-US" sz="2800" dirty="0" err="1">
+                <a:latin typeface="Times New Roman" panose="02020603050405020304" pitchFamily="18" charset="0"/>
+                <a:cs typeface="Times New Roman" panose="02020603050405020304" pitchFamily="18" charset="0"/>
+              </a:rPr>
+              <a:t>Faghri</a:t>
+            </a:r>
+            <a:r>
+              <a:rPr lang="en-US" sz="2800" dirty="0">
+                <a:latin typeface="Times New Roman" panose="02020603050405020304" pitchFamily="18" charset="0"/>
+                <a:cs typeface="Times New Roman" panose="02020603050405020304" pitchFamily="18" charset="0"/>
+              </a:rPr>
+              <a:t>, M., &amp; Park, K, 2015</a:t>
             </a:r>
             <a:r>
               <a:rPr lang="en-US" sz="2800" dirty="0">
@@ -4285,25 +4300,7 @@
                 <a:ea typeface="Aptos" panose="020B0004020202020204" pitchFamily="34" charset="0"/>
                 <a:cs typeface="Times New Roman" panose="02020603050405020304" pitchFamily="18" charset="0"/>
               </a:rPr>
-              <a:t>, Yamada, </a:t>
-            </a:r>
-            <a:r>
-              <a:rPr lang="en-US" sz="2800" dirty="0" err="1">
-                <a:effectLst/>
-                <a:latin typeface="Aptos" panose="020B0004020202020204" pitchFamily="34" charset="0"/>
-                <a:ea typeface="Aptos" panose="020B0004020202020204" pitchFamily="34" charset="0"/>
-                <a:cs typeface="Times New Roman" panose="02020603050405020304" pitchFamily="18" charset="0"/>
-              </a:rPr>
-              <a:t>Faghri</a:t>
-            </a:r>
-            <a:r>
-              <a:rPr lang="en-US" sz="2800" dirty="0">
-                <a:effectLst/>
-                <a:latin typeface="Aptos" panose="020B0004020202020204" pitchFamily="34" charset="0"/>
-                <a:ea typeface="Aptos" panose="020B0004020202020204" pitchFamily="34" charset="0"/>
-                <a:cs typeface="Times New Roman" panose="02020603050405020304" pitchFamily="18" charset="0"/>
-              </a:rPr>
-              <a:t>, &amp; Park, 2015). </a:t>
+              <a:t>). </a:t>
             </a:r>
             <a:r>
               <a:rPr lang="en-US" sz="2800" dirty="0">
@@ -4334,8 +4331,8 @@
         </p:nvSpPr>
         <p:spPr>
           <a:xfrm>
-            <a:off x="25025749" y="21328863"/>
-            <a:ext cx="12074586" cy="9140964"/>
+            <a:off x="24908754" y="22140710"/>
+            <a:ext cx="12074586" cy="8894743"/>
           </a:xfrm>
           <a:prstGeom prst="rect">
             <a:avLst/>
@@ -4367,7 +4364,7 @@
           <a:lstStyle/>
           <a:p>
             <a:r>
-              <a:rPr lang="en-US" sz="2800" b="1" dirty="0">
+              <a:rPr lang="en-US" sz="2600" b="1" dirty="0">
                 <a:latin typeface="Times New Roman" panose="02020603050405020304" pitchFamily="18" charset="0"/>
                 <a:cs typeface="Times New Roman" panose="02020603050405020304" pitchFamily="18" charset="0"/>
               </a:rPr>
@@ -4376,228 +4373,228 @@
           </a:p>
           <a:p>
             <a:r>
-              <a:rPr lang="en-US" sz="2800" dirty="0">
+              <a:rPr lang="en-US" sz="2600" dirty="0">
                 <a:latin typeface="Times New Roman" panose="02020603050405020304" pitchFamily="18" charset="0"/>
                 <a:cs typeface="Times New Roman" panose="02020603050405020304" pitchFamily="18" charset="0"/>
               </a:rPr>
               <a:t>He, Y.-L., &amp; Xie, T. (2015). Advances of thermal conductivity models of nanoscale silica aerogel insulation material. </a:t>
             </a:r>
             <a:r>
-              <a:rPr lang="en-US" sz="2800" i="1" dirty="0">
+              <a:rPr lang="en-US" sz="2600" i="1" dirty="0">
                 <a:latin typeface="Times New Roman" panose="02020603050405020304" pitchFamily="18" charset="0"/>
                 <a:cs typeface="Times New Roman" panose="02020603050405020304" pitchFamily="18" charset="0"/>
               </a:rPr>
               <a:t>Applied Thermal Engineering</a:t>
             </a:r>
             <a:r>
-              <a:rPr lang="en-US" sz="2800" dirty="0">
+              <a:rPr lang="en-US" sz="2600" dirty="0">
                 <a:latin typeface="Times New Roman" panose="02020603050405020304" pitchFamily="18" charset="0"/>
                 <a:cs typeface="Times New Roman" panose="02020603050405020304" pitchFamily="18" charset="0"/>
               </a:rPr>
               <a:t>, 81, 28-50. </a:t>
             </a:r>
             <a:r>
-              <a:rPr lang="en-US" sz="2800" dirty="0">
+              <a:rPr lang="en-US" sz="2600" dirty="0">
                 <a:latin typeface="Times New Roman" panose="02020603050405020304" pitchFamily="18" charset="0"/>
                 <a:cs typeface="Times New Roman" panose="02020603050405020304" pitchFamily="18" charset="0"/>
                 <a:hlinkClick r:id="rId5"/>
               </a:rPr>
               <a:t>https://doi.org/10.1016/j.applthermaleng.2015.02.013</a:t>
             </a:r>
-            <a:endParaRPr lang="en-US" sz="2800" dirty="0">
+            <a:endParaRPr lang="en-US" sz="2600" dirty="0">
               <a:latin typeface="Times New Roman" panose="02020603050405020304" pitchFamily="18" charset="0"/>
               <a:cs typeface="Times New Roman" panose="02020603050405020304" pitchFamily="18" charset="0"/>
             </a:endParaRPr>
           </a:p>
           <a:p>
-            <a:endParaRPr lang="en-US" sz="2800" dirty="0">
+            <a:endParaRPr lang="en-US" sz="2600" dirty="0">
               <a:latin typeface="Times New Roman" panose="02020603050405020304" pitchFamily="18" charset="0"/>
               <a:cs typeface="Times New Roman" panose="02020603050405020304" pitchFamily="18" charset="0"/>
             </a:endParaRPr>
           </a:p>
           <a:p>
             <a:r>
-              <a:rPr lang="en-US" sz="2800" dirty="0" err="1">
+              <a:rPr lang="en-US" sz="2600" dirty="0" err="1">
                 <a:latin typeface="Times New Roman" panose="02020603050405020304" pitchFamily="18" charset="0"/>
                 <a:cs typeface="Times New Roman" panose="02020603050405020304" pitchFamily="18" charset="0"/>
               </a:rPr>
               <a:t>MathWorld</a:t>
             </a:r>
             <a:r>
-              <a:rPr lang="en-US" sz="2800" dirty="0">
+              <a:rPr lang="en-US" sz="2600" dirty="0">
                 <a:latin typeface="Times New Roman" panose="02020603050405020304" pitchFamily="18" charset="0"/>
                 <a:cs typeface="Times New Roman" panose="02020603050405020304" pitchFamily="18" charset="0"/>
               </a:rPr>
               <a:t>. (n.d.). Legendre Polynomial. Retrieved from </a:t>
             </a:r>
             <a:r>
-              <a:rPr lang="en-US" sz="2800" dirty="0">
+              <a:rPr lang="en-US" sz="2600" dirty="0">
                 <a:latin typeface="Times New Roman" panose="02020603050405020304" pitchFamily="18" charset="0"/>
                 <a:cs typeface="Times New Roman" panose="02020603050405020304" pitchFamily="18" charset="0"/>
                 <a:hlinkClick r:id="rId6"/>
               </a:rPr>
               <a:t>https://mathworld.wolfram.com/LegendrePolynomial.html</a:t>
             </a:r>
-            <a:endParaRPr lang="en-US" sz="2800" dirty="0">
+            <a:endParaRPr lang="en-US" sz="2600" dirty="0">
               <a:latin typeface="Times New Roman" panose="02020603050405020304" pitchFamily="18" charset="0"/>
               <a:cs typeface="Times New Roman" panose="02020603050405020304" pitchFamily="18" charset="0"/>
             </a:endParaRPr>
           </a:p>
           <a:p>
-            <a:endParaRPr lang="en-US" sz="2800" b="1" dirty="0">
+            <a:endParaRPr lang="en-US" sz="2600" b="1" dirty="0">
               <a:latin typeface="Times New Roman" panose="02020603050405020304" pitchFamily="18" charset="0"/>
               <a:cs typeface="Times New Roman" panose="02020603050405020304" pitchFamily="18" charset="0"/>
             </a:endParaRPr>
           </a:p>
           <a:p>
             <a:r>
-              <a:rPr lang="en-US" sz="2800" dirty="0" err="1">
+              <a:rPr lang="en-US" sz="2600" dirty="0" err="1">
                 <a:latin typeface="Times New Roman" panose="02020603050405020304" pitchFamily="18" charset="0"/>
                 <a:cs typeface="Times New Roman" panose="02020603050405020304" pitchFamily="18" charset="0"/>
               </a:rPr>
               <a:t>Mesforoush</a:t>
             </a:r>
             <a:r>
-              <a:rPr lang="en-US" sz="2800" dirty="0">
+              <a:rPr lang="en-US" sz="2600" dirty="0">
                 <a:latin typeface="Times New Roman" panose="02020603050405020304" pitchFamily="18" charset="0"/>
                 <a:cs typeface="Times New Roman" panose="02020603050405020304" pitchFamily="18" charset="0"/>
               </a:rPr>
               <a:t>, H., </a:t>
             </a:r>
             <a:r>
-              <a:rPr lang="en-US" sz="2800" dirty="0" err="1">
+              <a:rPr lang="en-US" sz="2600" dirty="0" err="1">
                 <a:latin typeface="Times New Roman" panose="02020603050405020304" pitchFamily="18" charset="0"/>
                 <a:cs typeface="Times New Roman" panose="02020603050405020304" pitchFamily="18" charset="0"/>
               </a:rPr>
               <a:t>Pakmanesh</a:t>
             </a:r>
             <a:r>
-              <a:rPr lang="en-US" sz="2800" dirty="0">
+              <a:rPr lang="en-US" sz="2600" dirty="0">
                 <a:latin typeface="Times New Roman" panose="02020603050405020304" pitchFamily="18" charset="0"/>
                 <a:cs typeface="Times New Roman" panose="02020603050405020304" pitchFamily="18" charset="0"/>
               </a:rPr>
               <a:t>, M. R., </a:t>
             </a:r>
             <a:r>
-              <a:rPr lang="en-US" sz="2800" dirty="0" err="1">
+              <a:rPr lang="en-US" sz="2600" dirty="0" err="1">
                 <a:latin typeface="Times New Roman" panose="02020603050405020304" pitchFamily="18" charset="0"/>
                 <a:cs typeface="Times New Roman" panose="02020603050405020304" pitchFamily="18" charset="0"/>
               </a:rPr>
               <a:t>Esfandiary</a:t>
             </a:r>
             <a:r>
-              <a:rPr lang="en-US" sz="2800" dirty="0">
+              <a:rPr lang="en-US" sz="2600" dirty="0">
                 <a:latin typeface="Times New Roman" panose="02020603050405020304" pitchFamily="18" charset="0"/>
                 <a:cs typeface="Times New Roman" panose="02020603050405020304" pitchFamily="18" charset="0"/>
               </a:rPr>
               <a:t>, H., </a:t>
             </a:r>
             <a:r>
-              <a:rPr lang="en-US" sz="2800" dirty="0" err="1">
+              <a:rPr lang="en-US" sz="2600" dirty="0" err="1">
                 <a:latin typeface="Times New Roman" panose="02020603050405020304" pitchFamily="18" charset="0"/>
                 <a:cs typeface="Times New Roman" panose="02020603050405020304" pitchFamily="18" charset="0"/>
               </a:rPr>
               <a:t>Asghari</a:t>
             </a:r>
             <a:r>
-              <a:rPr lang="en-US" sz="2800" dirty="0">
+              <a:rPr lang="en-US" sz="2600" dirty="0">
                 <a:latin typeface="Times New Roman" panose="02020603050405020304" pitchFamily="18" charset="0"/>
                 <a:cs typeface="Times New Roman" panose="02020603050405020304" pitchFamily="18" charset="0"/>
               </a:rPr>
               <a:t>, S., &amp; </a:t>
             </a:r>
             <a:r>
-              <a:rPr lang="en-US" sz="2800" dirty="0" err="1">
+              <a:rPr lang="en-US" sz="2600" dirty="0" err="1">
                 <a:latin typeface="Times New Roman" panose="02020603050405020304" pitchFamily="18" charset="0"/>
                 <a:cs typeface="Times New Roman" panose="02020603050405020304" pitchFamily="18" charset="0"/>
               </a:rPr>
               <a:t>Baniasadi</a:t>
             </a:r>
             <a:r>
-              <a:rPr lang="en-US" sz="2800" dirty="0">
+              <a:rPr lang="en-US" sz="2600" dirty="0">
                 <a:latin typeface="Times New Roman" panose="02020603050405020304" pitchFamily="18" charset="0"/>
                 <a:cs typeface="Times New Roman" panose="02020603050405020304" pitchFamily="18" charset="0"/>
               </a:rPr>
               <a:t>, E. (2019). Experimental and numerical analyses of thermal performance of a thin-film multi-layer insulation for satellite application. </a:t>
             </a:r>
             <a:r>
-              <a:rPr lang="en-US" sz="2800" i="1" dirty="0">
+              <a:rPr lang="en-US" sz="2600" i="1" dirty="0">
                 <a:latin typeface="Times New Roman" panose="02020603050405020304" pitchFamily="18" charset="0"/>
                 <a:cs typeface="Times New Roman" panose="02020603050405020304" pitchFamily="18" charset="0"/>
               </a:rPr>
               <a:t>Cryogenics</a:t>
             </a:r>
             <a:r>
-              <a:rPr lang="en-US" sz="2800" dirty="0">
+              <a:rPr lang="en-US" sz="2600" dirty="0">
                 <a:latin typeface="Times New Roman" panose="02020603050405020304" pitchFamily="18" charset="0"/>
                 <a:cs typeface="Times New Roman" panose="02020603050405020304" pitchFamily="18" charset="0"/>
               </a:rPr>
               <a:t>, 102, 77-84. </a:t>
             </a:r>
             <a:r>
-              <a:rPr lang="en-US" sz="2800" dirty="0">
+              <a:rPr lang="en-US" sz="2600" dirty="0">
                 <a:latin typeface="Times New Roman" panose="02020603050405020304" pitchFamily="18" charset="0"/>
                 <a:cs typeface="Times New Roman" panose="02020603050405020304" pitchFamily="18" charset="0"/>
                 <a:hlinkClick r:id="rId7"/>
               </a:rPr>
               <a:t>https://doi.org/10.1016/j.cryogenics.2019.07.005</a:t>
             </a:r>
-            <a:endParaRPr lang="en-US" sz="2800" dirty="0">
+            <a:endParaRPr lang="en-US" sz="2600" dirty="0">
               <a:latin typeface="Times New Roman" panose="02020603050405020304" pitchFamily="18" charset="0"/>
               <a:cs typeface="Times New Roman" panose="02020603050405020304" pitchFamily="18" charset="0"/>
             </a:endParaRPr>
           </a:p>
           <a:p>
-            <a:endParaRPr lang="en-US" sz="2800" b="1" dirty="0">
+            <a:endParaRPr lang="en-US" sz="2600" b="1" dirty="0">
               <a:latin typeface="Times New Roman" panose="02020603050405020304" pitchFamily="18" charset="0"/>
               <a:cs typeface="Times New Roman" panose="02020603050405020304" pitchFamily="18" charset="0"/>
             </a:endParaRPr>
           </a:p>
           <a:p>
             <a:r>
-              <a:rPr lang="en-US" sz="2800" i="1" dirty="0">
+              <a:rPr lang="en-US" sz="2600" i="1" dirty="0">
                 <a:latin typeface="Times New Roman" panose="02020603050405020304" pitchFamily="18" charset="0"/>
                 <a:cs typeface="Times New Roman" panose="02020603050405020304" pitchFamily="18" charset="0"/>
               </a:rPr>
               <a:t>Moreno-</a:t>
             </a:r>
             <a:r>
-              <a:rPr lang="en-US" sz="2800" i="1" dirty="0" err="1">
+              <a:rPr lang="en-US" sz="2600" i="1" dirty="0" err="1">
                 <a:latin typeface="Times New Roman" panose="02020603050405020304" pitchFamily="18" charset="0"/>
                 <a:cs typeface="Times New Roman" panose="02020603050405020304" pitchFamily="18" charset="0"/>
               </a:rPr>
               <a:t>SanSegundo</a:t>
             </a:r>
             <a:r>
-              <a:rPr lang="en-US" sz="2800" i="1" dirty="0">
+              <a:rPr lang="en-US" sz="2600" i="1" dirty="0">
                 <a:latin typeface="Times New Roman" panose="02020603050405020304" pitchFamily="18" charset="0"/>
                 <a:cs typeface="Times New Roman" panose="02020603050405020304" pitchFamily="18" charset="0"/>
               </a:rPr>
               <a:t>, J., Casado, C., Concha, D., Montemayor, A.S., &amp; </a:t>
             </a:r>
             <a:r>
-              <a:rPr lang="en-US" sz="2800" i="1" dirty="0" err="1">
+              <a:rPr lang="en-US" sz="2600" i="1" dirty="0" err="1">
                 <a:latin typeface="Times New Roman" panose="02020603050405020304" pitchFamily="18" charset="0"/>
                 <a:cs typeface="Times New Roman" panose="02020603050405020304" pitchFamily="18" charset="0"/>
               </a:rPr>
               <a:t>Marugán</a:t>
             </a:r>
             <a:r>
-              <a:rPr lang="en-US" sz="2800" i="1" dirty="0">
+              <a:rPr lang="en-US" sz="2600" i="1" dirty="0">
                 <a:latin typeface="Times New Roman" panose="02020603050405020304" pitchFamily="18" charset="0"/>
                 <a:cs typeface="Times New Roman" panose="02020603050405020304" pitchFamily="18" charset="0"/>
               </a:rPr>
               <a:t>, J. (2021). Optimization and parallelization of the discrete ordinate method for radiation transport simulation in </a:t>
             </a:r>
             <a:r>
-              <a:rPr lang="en-US" sz="2800" i="1" dirty="0" err="1">
+              <a:rPr lang="en-US" sz="2600" i="1" dirty="0" err="1">
                 <a:latin typeface="Times New Roman" panose="02020603050405020304" pitchFamily="18" charset="0"/>
                 <a:cs typeface="Times New Roman" panose="02020603050405020304" pitchFamily="18" charset="0"/>
               </a:rPr>
               <a:t>OpenFOAM</a:t>
             </a:r>
             <a:r>
-              <a:rPr lang="en-US" sz="2800" i="1" dirty="0">
+              <a:rPr lang="en-US" sz="2600" i="1" dirty="0">
                 <a:latin typeface="Times New Roman" panose="02020603050405020304" pitchFamily="18" charset="0"/>
                 <a:cs typeface="Times New Roman" panose="02020603050405020304" pitchFamily="18" charset="0"/>
               </a:rPr>
@@ -4605,90 +4602,63 @@
             </a:r>
           </a:p>
           <a:p>
-            <a:endParaRPr lang="en-US" sz="2800" b="1" i="1" dirty="0">
+            <a:endParaRPr lang="en-US" sz="2600" b="1" i="1" dirty="0">
               <a:latin typeface="Times New Roman" panose="02020603050405020304" pitchFamily="18" charset="0"/>
               <a:cs typeface="Times New Roman" panose="02020603050405020304" pitchFamily="18" charset="0"/>
             </a:endParaRPr>
           </a:p>
           <a:p>
             <a:r>
-              <a:rPr lang="en-US" sz="2800" b="0" i="0" u="none" strike="noStrike" dirty="0">
-                <a:solidFill>
-                  <a:srgbClr val="000000"/>
-                </a:solidFill>
-                <a:effectLst/>
+              <a:rPr lang="en-US" sz="2600" dirty="0" err="1">
                 <a:latin typeface="Times New Roman" panose="02020603050405020304" pitchFamily="18" charset="0"/>
                 <a:cs typeface="Times New Roman" panose="02020603050405020304" pitchFamily="18" charset="0"/>
               </a:rPr>
-              <a:t>Sina </a:t>
-            </a:r>
-            <a:r>
-              <a:rPr lang="en-US" sz="2800" b="0" i="0" u="none" strike="noStrike" dirty="0" err="1">
-                <a:solidFill>
-                  <a:srgbClr val="000000"/>
-                </a:solidFill>
-                <a:effectLst/>
+              <a:t>Hamian</a:t>
+            </a:r>
+            <a:r>
+              <a:rPr lang="en-US" sz="2600" dirty="0">
                 <a:latin typeface="Times New Roman" panose="02020603050405020304" pitchFamily="18" charset="0"/>
                 <a:cs typeface="Times New Roman" panose="02020603050405020304" pitchFamily="18" charset="0"/>
               </a:rPr>
-              <a:t>Hamian</a:t>
-            </a:r>
-            <a:r>
-              <a:rPr lang="en-US" sz="2800" b="0" i="0" u="none" strike="noStrike" dirty="0">
-                <a:solidFill>
-                  <a:srgbClr val="000000"/>
-                </a:solidFill>
-                <a:effectLst/>
+              <a:t>, S., Yamada, T., </a:t>
+            </a:r>
+            <a:r>
+              <a:rPr lang="en-US" sz="2600" dirty="0" err="1">
                 <a:latin typeface="Times New Roman" panose="02020603050405020304" pitchFamily="18" charset="0"/>
                 <a:cs typeface="Times New Roman" panose="02020603050405020304" pitchFamily="18" charset="0"/>
               </a:rPr>
-              <a:t> , Toru Yamada , Mohammad </a:t>
-            </a:r>
-            <a:r>
-              <a:rPr lang="en-US" sz="2800" b="0" i="0" u="none" strike="noStrike" dirty="0" err="1">
-                <a:solidFill>
-                  <a:srgbClr val="000000"/>
-                </a:solidFill>
-                <a:effectLst/>
+              <a:t>Faghri</a:t>
+            </a:r>
+            <a:r>
+              <a:rPr lang="en-US" sz="2600" dirty="0">
                 <a:latin typeface="Times New Roman" panose="02020603050405020304" pitchFamily="18" charset="0"/>
                 <a:cs typeface="Times New Roman" panose="02020603050405020304" pitchFamily="18" charset="0"/>
               </a:rPr>
-              <a:t>Faghri</a:t>
-            </a:r>
-            <a:r>
-              <a:rPr lang="en-US" sz="2800" b="0" i="0" u="none" strike="noStrike" dirty="0">
-                <a:solidFill>
-                  <a:srgbClr val="000000"/>
-                </a:solidFill>
-                <a:effectLst/>
+              <a:t>, M., &amp; Park, K. (2015). Finite element analysis of transient ballistic–diffusive phonon heat transport in two-dimensional domains. </a:t>
+            </a:r>
+            <a:r>
+              <a:rPr lang="en-US" sz="2600" i="1" dirty="0">
                 <a:latin typeface="Times New Roman" panose="02020603050405020304" pitchFamily="18" charset="0"/>
                 <a:cs typeface="Times New Roman" panose="02020603050405020304" pitchFamily="18" charset="0"/>
               </a:rPr>
-              <a:t> , </a:t>
-            </a:r>
-            <a:r>
-              <a:rPr lang="en-US" sz="2800" b="0" i="0" u="none" strike="noStrike" dirty="0" err="1">
-                <a:solidFill>
-                  <a:srgbClr val="000000"/>
-                </a:solidFill>
-                <a:effectLst/>
+              <a:t>International Journal of Heat and Mass Transfer, 80</a:t>
+            </a:r>
+            <a:r>
+              <a:rPr lang="en-US" sz="2600" dirty="0">
                 <a:latin typeface="Times New Roman" panose="02020603050405020304" pitchFamily="18" charset="0"/>
                 <a:cs typeface="Times New Roman" panose="02020603050405020304" pitchFamily="18" charset="0"/>
               </a:rPr>
-              <a:t>Keunhan</a:t>
-            </a:r>
-            <a:r>
-              <a:rPr lang="en-US" sz="2800" b="0" i="0" u="none" strike="noStrike" dirty="0">
-                <a:solidFill>
-                  <a:srgbClr val="000000"/>
-                </a:solidFill>
-                <a:effectLst/>
+              <a:t>, 781–788. </a:t>
+            </a:r>
+            <a:r>
+              <a:rPr lang="en-US" sz="2600" dirty="0">
                 <a:latin typeface="Times New Roman" panose="02020603050405020304" pitchFamily="18" charset="0"/>
                 <a:cs typeface="Times New Roman" panose="02020603050405020304" pitchFamily="18" charset="0"/>
-              </a:rPr>
-              <a:t> Park ;Finite element analysis of transient ballistic–diffusive phonon heat transport in two-dimensional domains,2014</a:t>
-            </a:r>
-            <a:endParaRPr lang="en-US" sz="2800" dirty="0">
+                <a:hlinkClick r:id="rId8"/>
+              </a:rPr>
+              <a:t>https://doi.org/10.1016/j.ijheatmasstransfer.2014.09.073</a:t>
+            </a:r>
+            <a:endParaRPr lang="en-US" sz="2600" dirty="0">
               <a:latin typeface="Times New Roman" panose="02020603050405020304" pitchFamily="18" charset="0"/>
               <a:cs typeface="Times New Roman" panose="02020603050405020304" pitchFamily="18" charset="0"/>
             </a:endParaRPr>
@@ -4756,7 +4726,7 @@
           <p:nvPr/>
         </p:nvPicPr>
         <p:blipFill>
-          <a:blip r:embed="rId8"/>
+          <a:blip r:embed="rId9"/>
           <a:srcRect/>
           <a:stretch>
             <a:fillRect/>
@@ -4786,7 +4756,7 @@
         </p:nvSpPr>
         <p:spPr>
           <a:xfrm>
-            <a:off x="24761958" y="15855529"/>
+            <a:off x="24761272" y="17788429"/>
             <a:ext cx="12074586" cy="4231928"/>
           </a:xfrm>
           <a:prstGeom prst="rect">
@@ -4845,10 +4815,10 @@
         </p:nvGrpSpPr>
         <p:grpSpPr>
           <a:xfrm>
-            <a:off x="1362074" y="17252832"/>
-            <a:ext cx="9989175" cy="4006968"/>
+            <a:off x="1069566" y="15815426"/>
+            <a:ext cx="11011338" cy="4454740"/>
             <a:chOff x="1147760" y="17190161"/>
-            <a:chExt cx="9989175" cy="4006968"/>
+            <a:chExt cx="9989175" cy="3955198"/>
           </a:xfrm>
         </p:grpSpPr>
         <p:pic>
@@ -4866,7 +4836,7 @@
             <p:nvPr/>
           </p:nvPicPr>
           <p:blipFill>
-            <a:blip r:embed="rId9">
+            <a:blip r:embed="rId10">
               <a:extLst>
                 <a:ext uri="{28A0092B-C50C-407E-A947-70E740481C1C}">
                   <a14:useLocalDpi xmlns:a14="http://schemas.microsoft.com/office/drawing/2010/main" val="0"/>
@@ -4902,7 +4872,7 @@
           <p:spPr>
             <a:xfrm>
               <a:off x="2226296" y="20735464"/>
-              <a:ext cx="8910639" cy="461665"/>
+              <a:ext cx="8910639" cy="409895"/>
             </a:xfrm>
             <a:prstGeom prst="rect">
               <a:avLst/>
@@ -4915,6 +4885,10 @@
             </a:bodyPr>
             <a:lstStyle/>
             <a:p>
+              <a:r>
+                <a:rPr lang="en-US" sz="2400" b="1" dirty="0"/>
+                <a:t>FIG 1. </a:t>
+              </a:r>
               <a:r>
                 <a:rPr lang="en-US" sz="2400" dirty="0"/>
                 <a:t>Structure of Multi Layer Insulation(</a:t>
@@ -4945,8 +4919,8 @@
         </p:nvSpPr>
         <p:spPr>
           <a:xfrm>
-            <a:off x="981074" y="21553944"/>
-            <a:ext cx="10601325" cy="2677656"/>
+            <a:off x="985420" y="20513973"/>
+            <a:ext cx="10601325" cy="3970318"/>
           </a:xfrm>
           <a:prstGeom prst="rect">
             <a:avLst/>
@@ -4960,8 +4934,10 @@
           <a:lstStyle/>
           <a:p>
             <a:r>
-              <a:rPr lang="en-US" sz="2800" dirty="0"/>
-              <a:t>Aerogel is a lightweight, nanoscale material noteworthy for its incredible thermal properties including its ability to withstand high temperatures and function as a strong thermal insulator (He &amp; Xie, 2015). As a result of the nanoporous structure of aerogel, Fourier heat transfer does not accurately model the thermal conductivity (He &amp; Xie, 2015). </a:t>
+              <a:rPr lang="en-US" sz="2800" dirty="0">
+                <a:latin typeface="Aptos" panose="020B0004020202020204" pitchFamily="34" charset="0"/>
+              </a:rPr>
+              <a:t>Aerogel is a lightweight, nanoscale material noteworthy for its incredible thermal properties including its ability to withstand high temperatures and function as a strong thermal insulator (He &amp; Xie, 2015). As a result of the nanoporous structure of aerogel, Fourier heat transfer does not accurately model the thermal conductivity (He &amp; Xie, 2015). MLI is also necessary for aerogel insulation applications because aerogel has low strength. Ceramic fiber, silica fiber, and mullite fiber are often used to reinforce the strength of aerogel. </a:t>
             </a:r>
           </a:p>
         </p:txBody>
@@ -4981,13 +4957,13 @@
           <p:nvPr/>
         </p:nvPicPr>
         <p:blipFill>
-          <a:blip r:embed="rId10">
+          <a:blip r:embed="rId11">
             <a:extLst>
               <a:ext uri="{28A0092B-C50C-407E-A947-70E740481C1C}">
                 <a14:useLocalDpi xmlns:a14="http://schemas.microsoft.com/office/drawing/2010/main" val="0"/>
               </a:ext>
               <a:ext uri="{96DAC541-7B7A-43D3-8B79-37D633B846F1}">
-                <asvg:svgBlip xmlns:asvg="http://schemas.microsoft.com/office/drawing/2016/SVG/main" r:embed="rId11"/>
+                <asvg:svgBlip xmlns:asvg="http://schemas.microsoft.com/office/drawing/2016/SVG/main" r:embed="rId12"/>
               </a:ext>
             </a:extLst>
           </a:blip>
@@ -4997,8 +4973,8 @@
         </p:blipFill>
         <p:spPr>
           <a:xfrm>
-            <a:off x="19968295" y="20087457"/>
-            <a:ext cx="4510759" cy="4510759"/>
+            <a:off x="20450059" y="26778861"/>
+            <a:ext cx="3962400" cy="3962400"/>
           </a:xfrm>
           <a:prstGeom prst="rect">
             <a:avLst/>
@@ -5019,10 +4995,10 @@
         </p:nvGrpSpPr>
         <p:grpSpPr>
           <a:xfrm>
-            <a:off x="12418828" y="11697147"/>
-            <a:ext cx="11011339" cy="7242305"/>
-            <a:chOff x="12300017" y="11731492"/>
-            <a:chExt cx="9829801" cy="5735030"/>
+            <a:off x="12917860" y="19378404"/>
+            <a:ext cx="11011339" cy="7326547"/>
+            <a:chOff x="12300017" y="11568701"/>
+            <a:chExt cx="9829801" cy="5801739"/>
           </a:xfrm>
         </p:grpSpPr>
         <p:pic>
@@ -5040,13 +5016,13 @@
             <p:nvPr/>
           </p:nvPicPr>
           <p:blipFill>
-            <a:blip r:embed="rId12">
+            <a:blip r:embed="rId13">
               <a:extLst>
                 <a:ext uri="{28A0092B-C50C-407E-A947-70E740481C1C}">
                   <a14:useLocalDpi xmlns:a14="http://schemas.microsoft.com/office/drawing/2010/main" val="0"/>
                 </a:ext>
                 <a:ext uri="{96DAC541-7B7A-43D3-8B79-37D633B846F1}">
-                  <asvg:svgBlip xmlns:asvg="http://schemas.microsoft.com/office/drawing/2016/SVG/main" r:embed="rId13"/>
+                  <asvg:svgBlip xmlns:asvg="http://schemas.microsoft.com/office/drawing/2016/SVG/main" r:embed="rId14"/>
                 </a:ext>
               </a:extLst>
             </a:blip>
@@ -5056,7 +5032,7 @@
           </p:blipFill>
           <p:spPr>
             <a:xfrm>
-              <a:off x="12801600" y="11731492"/>
+              <a:off x="12784402" y="11568701"/>
               <a:ext cx="8785914" cy="5307227"/>
             </a:xfrm>
             <a:prstGeom prst="rect">
@@ -5079,7 +5055,7 @@
           <p:spPr>
             <a:xfrm>
               <a:off x="12300017" y="17004857"/>
-              <a:ext cx="9829801" cy="461665"/>
+              <a:ext cx="9829801" cy="365583"/>
             </a:xfrm>
             <a:prstGeom prst="rect">
               <a:avLst/>
@@ -5092,6 +5068,10 @@
             </a:bodyPr>
             <a:lstStyle/>
             <a:p>
+              <a:r>
+                <a:rPr lang="en-US" sz="2400" b="1" dirty="0"/>
+                <a:t>FIG 4. </a:t>
+              </a:r>
               <a:r>
                 <a:rPr lang="en-US" sz="2400" dirty="0"/>
                 <a:t>Legendre Polynomials, note all roots fall between [-1,1] (</a:t>
@@ -5122,10 +5102,10 @@
         </p:nvGrpSpPr>
         <p:grpSpPr>
           <a:xfrm>
-            <a:off x="944956" y="24688800"/>
-            <a:ext cx="9637319" cy="6172200"/>
+            <a:off x="13358181" y="6218085"/>
+            <a:ext cx="11254419" cy="7082305"/>
             <a:chOff x="725881" y="24536400"/>
-            <a:chExt cx="9637319" cy="6172200"/>
+            <a:chExt cx="10111419" cy="6172200"/>
           </a:xfrm>
         </p:grpSpPr>
         <p:pic>
@@ -5143,7 +5123,7 @@
             <p:nvPr/>
           </p:nvPicPr>
           <p:blipFill>
-            <a:blip r:embed="rId14">
+            <a:blip r:embed="rId15">
               <a:extLst>
                 <a:ext uri="{28A0092B-C50C-407E-A947-70E740481C1C}">
                   <a14:useLocalDpi xmlns:a14="http://schemas.microsoft.com/office/drawing/2010/main" val="0"/>
@@ -5179,7 +5159,7 @@
           <p:spPr>
             <a:xfrm>
               <a:off x="725881" y="30246935"/>
-              <a:ext cx="9637319" cy="461665"/>
+              <a:ext cx="10111419" cy="461665"/>
             </a:xfrm>
             <a:prstGeom prst="rect">
               <a:avLst/>
@@ -5192,6 +5172,10 @@
             </a:bodyPr>
             <a:lstStyle/>
             <a:p>
+              <a:r>
+                <a:rPr lang="en-US" sz="2400" b="1" dirty="0"/>
+                <a:t>FIG 3. </a:t>
+              </a:r>
               <a:r>
                 <a:rPr lang="en-US" sz="2400" dirty="0"/>
                 <a:t>Scanning electron micrograph of silica aerogel network ((He &amp; Xie, 2015). </a:t>
@@ -5215,7 +5199,7 @@
           <p:nvPr/>
         </p:nvPicPr>
         <p:blipFill>
-          <a:blip r:embed="rId15">
+          <a:blip r:embed="rId16">
             <a:extLst>
               <a:ext uri="{28A0092B-C50C-407E-A947-70E740481C1C}">
                 <a14:useLocalDpi xmlns:a14="http://schemas.microsoft.com/office/drawing/2010/main" val="0"/>
@@ -5313,10 +5297,10 @@
         </p:nvGrpSpPr>
         <p:grpSpPr>
           <a:xfrm>
-            <a:off x="24688800" y="6400800"/>
-            <a:ext cx="12400649" cy="7920453"/>
-            <a:chOff x="11256398" y="23506219"/>
-            <a:chExt cx="10481803" cy="6422051"/>
+            <a:off x="24612600" y="9636076"/>
+            <a:ext cx="12400649" cy="7901655"/>
+            <a:chOff x="11130731" y="23434123"/>
+            <a:chExt cx="10481803" cy="6406809"/>
           </a:xfrm>
         </p:grpSpPr>
         <p:pic>
@@ -5334,7 +5318,7 @@
             <p:nvPr/>
           </p:nvPicPr>
           <p:blipFill>
-            <a:blip r:embed="rId16">
+            <a:blip r:embed="rId17">
               <a:extLst>
                 <a:ext uri="{28A0092B-C50C-407E-A947-70E740481C1C}">
                   <a14:useLocalDpi xmlns:a14="http://schemas.microsoft.com/office/drawing/2010/main" val="0"/>
@@ -5348,7 +5332,7 @@
           </p:blipFill>
           <p:spPr bwMode="auto">
             <a:xfrm>
-              <a:off x="11963400" y="23506219"/>
+              <a:off x="11950256" y="23434123"/>
               <a:ext cx="9067800" cy="6019799"/>
             </a:xfrm>
             <a:prstGeom prst="rect">
@@ -5380,8 +5364,8 @@
           </p:nvSpPr>
           <p:spPr>
             <a:xfrm>
-              <a:off x="11256398" y="29466605"/>
-              <a:ext cx="10481803" cy="461665"/>
+              <a:off x="11130731" y="29466605"/>
+              <a:ext cx="10481803" cy="374327"/>
             </a:xfrm>
             <a:prstGeom prst="rect">
               <a:avLst/>
@@ -5394,6 +5378,10 @@
             </a:bodyPr>
             <a:lstStyle/>
             <a:p>
+              <a:r>
+                <a:rPr lang="en-US" sz="2400" b="1" dirty="0"/>
+                <a:t>FIG 6. </a:t>
+              </a:r>
               <a:r>
                 <a:rPr lang="en-US" sz="2400" dirty="0"/>
                 <a:t>Discrete Ordinate Method for spherical domain (Moreno-</a:t>
@@ -5424,8 +5412,8 @@
         </p:nvSpPr>
         <p:spPr>
           <a:xfrm>
-            <a:off x="12176175" y="20573122"/>
-            <a:ext cx="7509216" cy="3539430"/>
+            <a:off x="12772311" y="27010358"/>
+            <a:ext cx="7181453" cy="3539430"/>
           </a:xfrm>
           <a:prstGeom prst="rect">
             <a:avLst/>
@@ -5461,10 +5449,10 @@
         </p:nvGrpSpPr>
         <p:grpSpPr>
           <a:xfrm>
-            <a:off x="12300017" y="25958502"/>
-            <a:ext cx="12286960" cy="3107845"/>
-            <a:chOff x="12277894" y="25149448"/>
-            <a:chExt cx="12286960" cy="3107845"/>
+            <a:off x="24802566" y="6235694"/>
+            <a:ext cx="13090097" cy="3046290"/>
+            <a:chOff x="12277893" y="25149448"/>
+            <a:chExt cx="12400649" cy="3046290"/>
           </a:xfrm>
         </p:grpSpPr>
         <p:pic>
@@ -5482,7 +5470,7 @@
             <p:nvPr/>
           </p:nvPicPr>
           <p:blipFill>
-            <a:blip r:embed="rId17">
+            <a:blip r:embed="rId18">
               <a:extLst>
                 <a:ext uri="{28A0092B-C50C-407E-A947-70E740481C1C}">
                   <a14:useLocalDpi xmlns:a14="http://schemas.microsoft.com/office/drawing/2010/main" val="0"/>
@@ -5517,8 +5505,8 @@
           </p:nvSpPr>
           <p:spPr>
             <a:xfrm>
-              <a:off x="12277894" y="27734073"/>
-              <a:ext cx="12286960" cy="523220"/>
+              <a:off x="12277893" y="27734073"/>
+              <a:ext cx="12400649" cy="461665"/>
             </a:xfrm>
             <a:prstGeom prst="rect">
               <a:avLst/>
@@ -5532,13 +5520,99 @@
             <a:lstStyle/>
             <a:p>
               <a:r>
-                <a:rPr lang="en-US" sz="2800" dirty="0"/>
+                <a:rPr lang="en-US" sz="2400" b="1" dirty="0"/>
+                <a:t>FIG 5. </a:t>
+              </a:r>
+              <a:r>
+                <a:rPr lang="en-US" sz="2400" dirty="0"/>
                 <a:t>Boltzmann Transport Equation simplified with gray relaxation time approximation</a:t>
               </a:r>
             </a:p>
           </p:txBody>
         </p:sp>
       </p:grpSp>
+      <p:pic>
+        <p:nvPicPr>
+          <p:cNvPr id="4" name="Picture 3" descr="A diagram of a gaseous heat conduction&#10;&#10;Description automatically generated">
+            <a:extLst>
+              <a:ext uri="{FF2B5EF4-FFF2-40B4-BE49-F238E27FC236}">
+                <a16:creationId xmlns:a16="http://schemas.microsoft.com/office/drawing/2014/main" id="{6D826B88-B551-CA43-D07B-0D0580FBBC36}"/>
+              </a:ext>
+            </a:extLst>
+          </p:cNvPr>
+          <p:cNvPicPr>
+            <a:picLocks noChangeAspect="1"/>
+          </p:cNvPicPr>
+          <p:nvPr/>
+        </p:nvPicPr>
+        <p:blipFill>
+          <a:blip r:embed="rId19">
+            <a:extLst>
+              <a:ext uri="{28A0092B-C50C-407E-A947-70E740481C1C}">
+                <a14:useLocalDpi xmlns:a14="http://schemas.microsoft.com/office/drawing/2010/main" val="0"/>
+              </a:ext>
+            </a:extLst>
+          </a:blip>
+          <a:stretch>
+            <a:fillRect/>
+          </a:stretch>
+        </p:blipFill>
+        <p:spPr>
+          <a:xfrm>
+            <a:off x="3210128" y="24727473"/>
+            <a:ext cx="5301747" cy="5162228"/>
+          </a:xfrm>
+          <a:prstGeom prst="rect">
+            <a:avLst/>
+          </a:prstGeom>
+        </p:spPr>
+      </p:pic>
+      <p:sp>
+        <p:nvSpPr>
+          <p:cNvPr id="5" name="TextBox 4">
+            <a:extLst>
+              <a:ext uri="{FF2B5EF4-FFF2-40B4-BE49-F238E27FC236}">
+                <a16:creationId xmlns:a16="http://schemas.microsoft.com/office/drawing/2014/main" id="{EC5A447A-BACF-702C-9CA2-83448D6F7BE7}"/>
+              </a:ext>
+            </a:extLst>
+          </p:cNvPr>
+          <p:cNvSpPr txBox="1"/>
+          <p:nvPr/>
+        </p:nvSpPr>
+        <p:spPr>
+          <a:xfrm>
+            <a:off x="1830762" y="29938885"/>
+            <a:ext cx="8910639" cy="461665"/>
+          </a:xfrm>
+          <a:prstGeom prst="rect">
+            <a:avLst/>
+          </a:prstGeom>
+          <a:noFill/>
+        </p:spPr>
+        <p:txBody>
+          <a:bodyPr wrap="square" rtlCol="0">
+            <a:spAutoFit/>
+          </a:bodyPr>
+          <a:lstStyle/>
+          <a:p>
+            <a:r>
+              <a:rPr lang="en-US" sz="2400" b="1" dirty="0"/>
+              <a:t>FIG 2. </a:t>
+            </a:r>
+            <a:r>
+              <a:rPr lang="en-US" sz="2400" dirty="0"/>
+              <a:t>Different heat transfer modes inside aerogel </a:t>
+            </a:r>
+            <a:r>
+              <a:rPr lang="en-US" sz="2400" dirty="0">
+                <a:latin typeface="Aptos" panose="020B0004020202020204" pitchFamily="34" charset="0"/>
+              </a:rPr>
+              <a:t>(He &amp; Xie, 2015)</a:t>
+            </a:r>
+            <a:endParaRPr lang="en-US" sz="2400" dirty="0"/>
+          </a:p>
+        </p:txBody>
+      </p:sp>
     </p:spTree>
     <p:extLst>
       <p:ext uri="{BB962C8B-B14F-4D97-AF65-F5344CB8AC3E}">

</xml_diff>